<commit_message>
refine lab # 6 and # 7
</commit_message>
<xml_diff>
--- a/classes/prog2015/Lab6_and_7.pptx
+++ b/classes/prog2015/Lab6_and_7.pptx
@@ -8,6 +8,7 @@
     <p:sldId id="256" r:id="rId2"/>
     <p:sldId id="257" r:id="rId3"/>
     <p:sldId id="258" r:id="rId4"/>
+    <p:sldId id="259" r:id="rId5"/>
   </p:sldIdLst>
   <p:sldSz cx="9144000" cy="6858000" type="screen4x3"/>
   <p:notesSz cx="6858000" cy="9144000"/>
@@ -3159,7 +3160,7 @@
         </p:nvSpPr>
         <p:spPr>
           <a:xfrm>
-            <a:off x="685800" y="3316069"/>
+            <a:off x="685800" y="3352800"/>
             <a:ext cx="7543800" cy="646331"/>
           </a:xfrm>
           <a:prstGeom prst="rect">
@@ -3742,7 +3743,7 @@
         <p:spPr>
           <a:xfrm>
             <a:off x="152400" y="-76200"/>
-            <a:ext cx="9027023" cy="7571303"/>
+            <a:ext cx="8473345" cy="5632311"/>
           </a:xfrm>
           <a:prstGeom prst="rect">
             <a:avLst/>
@@ -3775,15 +3776,7 @@
           <a:p>
             <a:r>
               <a:rPr lang="en-US" dirty="0" smtClean="0"/>
-              <a:t>For lab #6 (</a:t>
-            </a:r>
-            <a:r>
-              <a:rPr lang="en-US" dirty="0" smtClean="0"/>
-              <a:t>Due Wed Oct. 28</a:t>
-            </a:r>
-            <a:r>
-              <a:rPr lang="en-US" dirty="0" smtClean="0"/>
-              <a:t>), design the GUI for your protein quiz application..</a:t>
+              <a:t>For lab #6 (Due Wed Oct. 28), design the GUI for your protein quiz application..</a:t>
             </a:r>
           </a:p>
           <a:p>
@@ -3798,11 +3791,47 @@
           <a:p>
             <a:r>
               <a:rPr lang="en-US" dirty="0" smtClean="0"/>
-              <a:t>	</a:t>
-            </a:r>
+              <a:t>	You don’t need to implement the functionality yet </a:t>
+            </a:r>
+          </a:p>
+          <a:p>
             <a:r>
               <a:rPr lang="en-US" dirty="0" smtClean="0"/>
-              <a:t>You don’t need to implement the functionality yet </a:t>
+              <a:t>	(so the buttons,  menus or other controls should be present but they don’t</a:t>
+            </a:r>
+          </a:p>
+          <a:p>
+            <a:r>
+              <a:rPr lang="en-US" dirty="0" smtClean="0"/>
+              <a:t>	have to do anything yet…)</a:t>
+            </a:r>
+          </a:p>
+          <a:p>
+            <a:endParaRPr lang="en-US" dirty="0" smtClean="0"/>
+          </a:p>
+          <a:p>
+            <a:r>
+              <a:rPr lang="en-US" dirty="0" smtClean="0"/>
+              <a:t>	Have the user be able to control how long the quiz will go before it terminates</a:t>
+            </a:r>
+          </a:p>
+          <a:p>
+            <a:r>
+              <a:rPr lang="en-US" dirty="0" smtClean="0"/>
+              <a:t>	(maybe a menu or some other interface</a:t>
+            </a:r>
+            <a:r>
+              <a:rPr lang="en-US" dirty="0" smtClean="0"/>
+              <a:t>?)</a:t>
+            </a:r>
+          </a:p>
+          <a:p>
+            <a:endParaRPr lang="en-US" dirty="0" smtClean="0"/>
+          </a:p>
+          <a:p>
+            <a:r>
+              <a:rPr lang="en-US" dirty="0" smtClean="0"/>
+              <a:t>	Have a cancel button (so the user can cancel an on-going quiz and see their</a:t>
             </a:r>
           </a:p>
           <a:p>
@@ -3812,7 +3841,131 @@
             </a:r>
             <a:r>
               <a:rPr lang="en-US" dirty="0" smtClean="0"/>
-              <a:t>(so the buttons,  menus or other controls should be present but they don’t</a:t>
+              <a:t>results or start again</a:t>
+            </a:r>
+            <a:r>
+              <a:rPr lang="en-US" dirty="0" smtClean="0"/>
+              <a:t>)</a:t>
+            </a:r>
+            <a:endParaRPr lang="en-US" dirty="0" smtClean="0"/>
+          </a:p>
+          <a:p>
+            <a:endParaRPr lang="en-US" dirty="0" smtClean="0"/>
+          </a:p>
+          <a:p>
+            <a:r>
+              <a:rPr lang="en-US" dirty="0" smtClean="0"/>
+              <a:t>	If you show me a GUI you have designed on paper, I can help you find the right</a:t>
+            </a:r>
+          </a:p>
+          <a:p>
+            <a:r>
+              <a:rPr lang="en-US" dirty="0" smtClean="0"/>
+              <a:t>	tools to put that GUI into Java..</a:t>
+            </a:r>
+          </a:p>
+          <a:p>
+            <a:endParaRPr lang="en-US" dirty="0" smtClean="0"/>
+          </a:p>
+        </p:txBody>
+      </p:sp>
+      <p:sp>
+        <p:nvSpPr>
+          <p:cNvPr id="3" name="TextBox 2"/>
+          <p:cNvSpPr txBox="1"/>
+          <p:nvPr/>
+        </p:nvSpPr>
+        <p:spPr>
+          <a:xfrm>
+            <a:off x="3048000" y="6019800"/>
+            <a:ext cx="1687129" cy="369332"/>
+          </a:xfrm>
+          <a:prstGeom prst="rect">
+            <a:avLst/>
+          </a:prstGeom>
+          <a:noFill/>
+        </p:spPr>
+        <p:txBody>
+          <a:bodyPr wrap="none" rtlCol="0">
+            <a:spAutoFit/>
+          </a:bodyPr>
+          <a:lstStyle/>
+          <a:p>
+            <a:r>
+              <a:rPr lang="en-US" smtClean="0"/>
+              <a:t>see </a:t>
+            </a:r>
+            <a:r>
+              <a:rPr lang="en-US" dirty="0" smtClean="0"/>
+              <a:t>next slide….</a:t>
+            </a:r>
+            <a:endParaRPr lang="en-US" dirty="0"/>
+          </a:p>
+        </p:txBody>
+      </p:sp>
+    </p:spTree>
+  </p:cSld>
+  <p:clrMapOvr>
+    <a:masterClrMapping/>
+  </p:clrMapOvr>
+</p:sld>
+</file>
+
+<file path=ppt/slides/slide4.xml><?xml version="1.0" encoding="utf-8"?>
+<p:sld xmlns:a="http://schemas.openxmlformats.org/drawingml/2006/main" xmlns:r="http://schemas.openxmlformats.org/officeDocument/2006/relationships" xmlns:p="http://schemas.openxmlformats.org/presentationml/2006/main">
+  <p:cSld>
+    <p:spTree>
+      <p:nvGrpSpPr>
+        <p:cNvPr id="1" name=""/>
+        <p:cNvGrpSpPr/>
+        <p:nvPr/>
+      </p:nvGrpSpPr>
+      <p:grpSpPr>
+        <a:xfrm>
+          <a:off x="0" y="0"/>
+          <a:ext cx="0" cy="0"/>
+          <a:chOff x="0" y="0"/>
+          <a:chExt cx="0" cy="0"/>
+        </a:xfrm>
+      </p:grpSpPr>
+      <p:sp>
+        <p:nvSpPr>
+          <p:cNvPr id="4" name="Rectangle 3"/>
+          <p:cNvSpPr/>
+          <p:nvPr/>
+        </p:nvSpPr>
+        <p:spPr>
+          <a:xfrm>
+            <a:off x="304800" y="767477"/>
+            <a:ext cx="8610600" cy="2585323"/>
+          </a:xfrm>
+          <a:prstGeom prst="rect">
+            <a:avLst/>
+          </a:prstGeom>
+        </p:spPr>
+        <p:txBody>
+          <a:bodyPr wrap="square">
+            <a:spAutoFit/>
+          </a:bodyPr>
+          <a:lstStyle/>
+          <a:p>
+            <a:r>
+              <a:rPr lang="en-US" dirty="0" smtClean="0"/>
+              <a:t>For lab #7: (Due November 6</a:t>
+            </a:r>
+            <a:r>
+              <a:rPr lang="en-US" baseline="30000" dirty="0" smtClean="0"/>
+              <a:t>th</a:t>
+            </a:r>
+            <a:r>
+              <a:rPr lang="en-US" dirty="0" smtClean="0"/>
+              <a:t>):</a:t>
+            </a:r>
+          </a:p>
+          <a:p>
+            <a:r>
+              <a:rPr lang="en-US" dirty="0" smtClean="0"/>
+              <a:t>	Make your GUI actually work.</a:t>
             </a:r>
           </a:p>
           <a:p>
@@ -3820,19 +3973,7 @@
               <a:rPr lang="en-US" dirty="0" smtClean="0"/>
               <a:t>	</a:t>
             </a:r>
-            <a:r>
-              <a:rPr lang="en-US" dirty="0" smtClean="0"/>
-              <a:t>have to do anything yet…)</a:t>
-            </a:r>
-          </a:p>
-          <a:p>
             <a:endParaRPr lang="en-US" dirty="0" smtClean="0"/>
-          </a:p>
-          <a:p>
-            <a:r>
-              <a:rPr lang="en-US" dirty="0" smtClean="0"/>
-              <a:t>	Have the user be able to control how long the quiz will go before it terminates</a:t>
-            </a:r>
           </a:p>
           <a:p>
             <a:r>
@@ -3841,86 +3982,25 @@
             </a:r>
             <a:r>
               <a:rPr lang="en-US" dirty="0" smtClean="0"/>
-              <a:t>(maybe a menu or some other interface?)</a:t>
-            </a:r>
-          </a:p>
-          <a:p>
-            <a:endParaRPr lang="en-US" dirty="0" smtClean="0"/>
-          </a:p>
-          <a:p>
+              <a:t>Make </a:t>
+            </a:r>
             <a:r>
               <a:rPr lang="en-US" dirty="0" smtClean="0"/>
-              <a:t>	If you show me a GUI you have designed on paper, I can help you find the right</a:t>
+              <a:t>it so that the quiz will run for the # of seconds the user has chosen,</a:t>
             </a:r>
           </a:p>
           <a:p>
             <a:r>
               <a:rPr lang="en-US" dirty="0" smtClean="0"/>
-              <a:t>	</a:t>
+              <a:t>	then terminate and show how many the user got right and wrong for each </a:t>
             </a:r>
             <a:r>
               <a:rPr lang="en-US" dirty="0" smtClean="0"/>
-              <a:t>tools to put that GUI into Java..</a:t>
-            </a:r>
-          </a:p>
-          <a:p>
-            <a:endParaRPr lang="en-US" dirty="0" smtClean="0"/>
-          </a:p>
-          <a:p>
-            <a:endParaRPr lang="en-US" dirty="0" smtClean="0"/>
-          </a:p>
-          <a:p>
+              <a:t>	amino acid</a:t>
+            </a:r>
             <a:r>
               <a:rPr lang="en-US" dirty="0" smtClean="0"/>
-              <a:t>For lab #7: (Due November 6</a:t>
-            </a:r>
-            <a:r>
-              <a:rPr lang="en-US" baseline="30000" dirty="0" smtClean="0"/>
-              <a:t>th</a:t>
-            </a:r>
-            <a:r>
-              <a:rPr lang="en-US" dirty="0" smtClean="0"/>
-              <a:t>):</a:t>
-            </a:r>
-          </a:p>
-          <a:p>
-            <a:r>
-              <a:rPr lang="en-US" dirty="0" smtClean="0"/>
-              <a:t>	</a:t>
-            </a:r>
-            <a:r>
-              <a:rPr lang="en-US" dirty="0" smtClean="0"/>
-              <a:t>Make your GUI actually work.</a:t>
-            </a:r>
-          </a:p>
-          <a:p>
-            <a:r>
-              <a:rPr lang="en-US" dirty="0" smtClean="0"/>
-              <a:t>	</a:t>
-            </a:r>
-            <a:r>
-              <a:rPr lang="en-US" dirty="0" smtClean="0"/>
-              <a:t>Make it so that the quiz will run for the # of seconds the user has chosen,</a:t>
-            </a:r>
-          </a:p>
-          <a:p>
-            <a:r>
-              <a:rPr lang="en-US" dirty="0" smtClean="0"/>
-              <a:t>	</a:t>
-            </a:r>
-            <a:r>
-              <a:rPr lang="en-US" dirty="0" smtClean="0"/>
-              <a:t>then terminate and show how many the user got right and wrong for each amino</a:t>
-            </a:r>
-          </a:p>
-          <a:p>
-            <a:r>
-              <a:rPr lang="en-US" dirty="0" smtClean="0"/>
-              <a:t>	</a:t>
-            </a:r>
-            <a:r>
-              <a:rPr lang="en-US" dirty="0" smtClean="0"/>
-              <a:t>acid.</a:t>
+              <a:t>.</a:t>
             </a:r>
           </a:p>
           <a:p>

</xml_diff>